<commit_message>
Clean version of MiniCon algorithm considering preferences (POTI)
</commit_message>
<xml_diff>
--- a/Presentations/DEXA 2015 Presentation.pptx
+++ b/Presentations/DEXA 2015 Presentation.pptx
@@ -5,10 +5,10 @@
     <p:sldMasterId id="2147494087" r:id="rId4"/>
   </p:sldMasterIdLst>
   <p:notesMasterIdLst>
-    <p:notesMasterId r:id="rId31"/>
+    <p:notesMasterId r:id="rId30"/>
   </p:notesMasterIdLst>
   <p:handoutMasterIdLst>
-    <p:handoutMasterId r:id="rId32"/>
+    <p:handoutMasterId r:id="rId31"/>
   </p:handoutMasterIdLst>
   <p:sldIdLst>
     <p:sldId id="256" r:id="rId5"/>
@@ -33,10 +33,9 @@
     <p:sldId id="292" r:id="rId24"/>
     <p:sldId id="274" r:id="rId25"/>
     <p:sldId id="293" r:id="rId26"/>
-    <p:sldId id="279" r:id="rId27"/>
-    <p:sldId id="280" r:id="rId28"/>
-    <p:sldId id="278" r:id="rId29"/>
-    <p:sldId id="264" r:id="rId30"/>
+    <p:sldId id="280" r:id="rId27"/>
+    <p:sldId id="296" r:id="rId28"/>
+    <p:sldId id="264" r:id="rId29"/>
   </p:sldIdLst>
   <p:sldSz cx="9144000" cy="6858000" type="screen4x3"/>
   <p:notesSz cx="6858000" cy="9144000"/>
@@ -220,7 +219,7 @@
           <a:p>
             <a:fld id="{652FA383-9D4B-AD42-9BF3-88FCA749BE0E}" type="datetimeFigureOut">
               <a:rPr lang="en-US" smtClean="0"/>
-              <a:t>8/24/2015</a:t>
+              <a:t>8/25/2015</a:t>
             </a:fld>
             <a:endParaRPr lang="pt-BR"/>
           </a:p>
@@ -385,7 +384,7 @@
           <a:p>
             <a:fld id="{C888862E-4053-6841-80C1-EE02861216A5}" type="datetimeFigureOut">
               <a:rPr lang="en-US" smtClean="0"/>
-              <a:t>8/24/2015</a:t>
+              <a:t>8/25/2015</a:t>
             </a:fld>
             <a:endParaRPr lang="pt-BR"/>
           </a:p>
@@ -1976,7 +1975,7 @@
             <a:fld id="{8ACDB3CC-F982-40F9-8DD6-BCC9AFBF44BD}" type="datetime1">
               <a:rPr lang="en-US" smtClean="0"/>
               <a:pPr/>
-              <a:t>8/24/2015</a:t>
+              <a:t>8/25/2015</a:t>
             </a:fld>
             <a:endParaRPr lang="en-US" dirty="0"/>
           </a:p>
@@ -2141,7 +2140,7 @@
           <a:p>
             <a:fld id="{68C2560D-EC28-3B41-86E8-18F1CE0113B4}" type="datetimeFigureOut">
               <a:rPr lang="en-US" smtClean="0"/>
-              <a:t>8/24/2015</a:t>
+              <a:t>8/25/2015</a:t>
             </a:fld>
             <a:endParaRPr lang="en-US"/>
           </a:p>
@@ -2316,7 +2315,7 @@
           <a:p>
             <a:fld id="{68C2560D-EC28-3B41-86E8-18F1CE0113B4}" type="datetimeFigureOut">
               <a:rPr lang="en-US" smtClean="0"/>
-              <a:t>8/24/2015</a:t>
+              <a:t>8/25/2015</a:t>
             </a:fld>
             <a:endParaRPr lang="en-US"/>
           </a:p>
@@ -2499,7 +2498,7 @@
           <a:p>
             <a:fld id="{68C2560D-EC28-3B41-86E8-18F1CE0113B4}" type="datetimeFigureOut">
               <a:rPr lang="en-US" smtClean="0"/>
-              <a:t>8/24/2015</a:t>
+              <a:t>8/25/2015</a:t>
             </a:fld>
             <a:endParaRPr lang="en-US"/>
           </a:p>
@@ -2762,7 +2761,7 @@
             <a:fld id="{4A9E7B99-7C3F-4BC3-B7B8-7E1F8C620B24}" type="datetime1">
               <a:rPr lang="en-US" smtClean="0"/>
               <a:pPr/>
-              <a:t>8/24/2015</a:t>
+              <a:t>8/25/2015</a:t>
             </a:fld>
             <a:endParaRPr lang="en-US"/>
           </a:p>
@@ -3110,7 +3109,7 @@
           <a:p>
             <a:fld id="{68C2560D-EC28-3B41-86E8-18F1CE0113B4}" type="datetimeFigureOut">
               <a:rPr lang="en-US" smtClean="0"/>
-              <a:t>8/24/2015</a:t>
+              <a:t>8/25/2015</a:t>
             </a:fld>
             <a:endParaRPr lang="en-US"/>
           </a:p>
@@ -3418,7 +3417,7 @@
           <a:p>
             <a:fld id="{68C2560D-EC28-3B41-86E8-18F1CE0113B4}" type="datetimeFigureOut">
               <a:rPr lang="en-US" smtClean="0"/>
-              <a:t>8/24/2015</a:t>
+              <a:t>8/25/2015</a:t>
             </a:fld>
             <a:endParaRPr lang="en-US"/>
           </a:p>
@@ -3645,7 +3644,7 @@
           <a:p>
             <a:fld id="{68C2560D-EC28-3B41-86E8-18F1CE0113B4}" type="datetimeFigureOut">
               <a:rPr lang="en-US" smtClean="0"/>
-              <a:t>8/24/2015</a:t>
+              <a:t>8/25/2015</a:t>
             </a:fld>
             <a:endParaRPr lang="en-US"/>
           </a:p>
@@ -3735,7 +3734,7 @@
           <a:p>
             <a:fld id="{68C2560D-EC28-3B41-86E8-18F1CE0113B4}" type="datetimeFigureOut">
               <a:rPr lang="en-US" smtClean="0"/>
-              <a:t>8/24/2015</a:t>
+              <a:t>8/25/2015</a:t>
             </a:fld>
             <a:endParaRPr lang="en-US"/>
           </a:p>
@@ -4023,7 +4022,7 @@
           <a:p>
             <a:fld id="{68C2560D-EC28-3B41-86E8-18F1CE0113B4}" type="datetimeFigureOut">
               <a:rPr lang="en-US" smtClean="0"/>
-              <a:t>8/24/2015</a:t>
+              <a:t>8/25/2015</a:t>
             </a:fld>
             <a:endParaRPr lang="en-US"/>
           </a:p>
@@ -4293,7 +4292,7 @@
           <a:p>
             <a:fld id="{68C2560D-EC28-3B41-86E8-18F1CE0113B4}" type="datetimeFigureOut">
               <a:rPr lang="en-US" smtClean="0"/>
-              <a:t>8/24/2015</a:t>
+              <a:t>8/25/2015</a:t>
             </a:fld>
             <a:endParaRPr lang="en-US"/>
           </a:p>
@@ -4503,7 +4502,7 @@
           <a:p>
             <a:fld id="{68C2560D-EC28-3B41-86E8-18F1CE0113B4}" type="datetimeFigureOut">
               <a:rPr lang="en-US" smtClean="0"/>
-              <a:t>8/24/2015</a:t>
+              <a:t>8/25/2015</a:t>
             </a:fld>
             <a:endParaRPr lang="en-US"/>
           </a:p>
@@ -9370,11 +9369,6 @@
               </a:rPr>
               <a:t>quality on multi-cloud environments</a:t>
             </a:r>
-            <a:endParaRPr lang="en-US" sz="2300" dirty="0" smtClean="0">
-              <a:solidFill>
-                <a:schemeClr val="tx1"/>
-              </a:solidFill>
-            </a:endParaRPr>
           </a:p>
           <a:p>
             <a:endParaRPr lang="en-US" sz="2300" dirty="0" smtClean="0">
@@ -10168,11 +10162,22 @@
         <p:spPr/>
         <p:txBody>
           <a:bodyPr>
-            <a:normAutofit fontScale="92500" lnSpcReduction="20000"/>
+            <a:normAutofit fontScale="92500" lnSpcReduction="10000"/>
           </a:bodyPr>
           <a:lstStyle/>
           <a:p>
             <a:pPr algn="just"/>
+            <a:r>
+              <a:rPr lang="en-US" dirty="0" smtClean="0">
+                <a:solidFill>
+                  <a:schemeClr val="tx1"/>
+                </a:solidFill>
+              </a:rPr>
+              <a:t>We identified trends and open issues in our research topic </a:t>
+            </a:r>
+          </a:p>
+          <a:p>
+            <a:pPr lvl="1" algn="just"/>
             <a:endParaRPr lang="en-US" dirty="0" smtClean="0">
               <a:solidFill>
                 <a:schemeClr val="tx1"/>
@@ -10180,71 +10185,75 @@
             </a:endParaRPr>
           </a:p>
           <a:p>
-            <a:pPr algn="just"/>
+            <a:pPr lvl="1" algn="just"/>
             <a:r>
               <a:rPr lang="en-US" dirty="0" smtClean="0">
                 <a:solidFill>
                   <a:schemeClr val="tx1"/>
                 </a:solidFill>
               </a:rPr>
-              <a:t>The </a:t>
-            </a:r>
-            <a:r>
-              <a:rPr lang="en-US" dirty="0">
-                <a:solidFill>
-                  <a:schemeClr val="tx1"/>
-                </a:solidFill>
-              </a:rPr>
-              <a:t>challenge of integrating data from distributed </a:t>
-            </a:r>
+              <a:t>QoS has started to be considered for integration data</a:t>
+            </a:r>
+          </a:p>
+          <a:p>
+            <a:pPr lvl="1" algn="just"/>
+            <a:endParaRPr lang="en-US" dirty="0" smtClean="0">
+              <a:solidFill>
+                <a:schemeClr val="tx1"/>
+              </a:solidFill>
+            </a:endParaRPr>
+          </a:p>
+          <a:p>
+            <a:pPr lvl="1" algn="just"/>
             <a:r>
               <a:rPr lang="en-US" dirty="0" smtClean="0">
                 <a:solidFill>
                   <a:schemeClr val="tx1"/>
                 </a:solidFill>
               </a:rPr>
-              <a:t>data services </a:t>
-            </a:r>
-            <a:r>
-              <a:rPr lang="en-US" dirty="0">
-                <a:solidFill>
-                  <a:schemeClr val="tx1"/>
-                </a:solidFill>
-              </a:rPr>
-              <a:t>deployed on </a:t>
-            </a:r>
+              <a:t>The cloud is becoming a popular environment to perform data integration in which security issues are the most frequently addressed</a:t>
+            </a:r>
+          </a:p>
+          <a:p>
+            <a:pPr lvl="1" algn="just"/>
+            <a:endParaRPr lang="en-US" dirty="0" smtClean="0">
+              <a:solidFill>
+                <a:schemeClr val="tx1"/>
+              </a:solidFill>
+            </a:endParaRPr>
+          </a:p>
+          <a:p>
+            <a:pPr lvl="1" algn="just"/>
             <a:r>
               <a:rPr lang="en-US" dirty="0" smtClean="0">
                 <a:solidFill>
                   <a:schemeClr val="tx1"/>
                 </a:solidFill>
               </a:rPr>
-              <a:t>different </a:t>
-            </a:r>
-            <a:r>
-              <a:rPr lang="en-US" dirty="0">
-                <a:solidFill>
-                  <a:schemeClr val="tx1"/>
-                </a:solidFill>
-              </a:rPr>
-              <a:t>cloud providers guided by SLAs and user </a:t>
-            </a:r>
+              <a:t>We identified a promising research area concerning the need of studying SLA to be specialized for data integration</a:t>
+            </a:r>
+          </a:p>
+          <a:p>
+            <a:pPr lvl="1" algn="just"/>
+            <a:endParaRPr lang="en-US" dirty="0" smtClean="0">
+              <a:solidFill>
+                <a:schemeClr val="tx1"/>
+              </a:solidFill>
+            </a:endParaRPr>
+          </a:p>
+          <a:p>
+            <a:pPr lvl="1" algn="just"/>
             <a:r>
               <a:rPr lang="en-US" dirty="0" smtClean="0">
                 <a:solidFill>
                   <a:schemeClr val="tx1"/>
                 </a:solidFill>
               </a:rPr>
-              <a:t>preferences </a:t>
-            </a:r>
-            <a:r>
-              <a:rPr lang="en-US" dirty="0">
-                <a:solidFill>
-                  <a:schemeClr val="tx1"/>
-                </a:solidFill>
-              </a:rPr>
-              <a:t>statement. </a:t>
-            </a:r>
+              <a:t>It is important to identify that characterize the quality of data and measures associated to different phases of data integration (such as selecting data services, retrieving data, integrating, etc.)</a:t>
+            </a:r>
+          </a:p>
+          <a:p>
+            <a:pPr lvl="1" algn="just"/>
             <a:endParaRPr lang="en-US" dirty="0" smtClean="0">
               <a:solidFill>
                 <a:schemeClr val="tx1"/>
@@ -10252,30 +10261,14 @@
             </a:endParaRPr>
           </a:p>
           <a:p>
-            <a:pPr algn="just"/>
-            <a:endParaRPr lang="en-US" dirty="0" smtClean="0">
-              <a:solidFill>
-                <a:schemeClr val="tx1"/>
-              </a:solidFill>
-            </a:endParaRPr>
-          </a:p>
-          <a:p>
-            <a:pPr algn="just"/>
+            <a:pPr lvl="1" algn="just"/>
             <a:r>
               <a:rPr lang="en-US" dirty="0" smtClean="0">
                 <a:solidFill>
                   <a:schemeClr val="tx1"/>
                 </a:solidFill>
               </a:rPr>
-              <a:t>The </a:t>
-            </a:r>
-            <a:r>
-              <a:rPr lang="en-US" dirty="0">
-                <a:solidFill>
-                  <a:schemeClr val="tx1"/>
-                </a:solidFill>
-              </a:rPr>
-              <a:t>problem statement was derived from a </a:t>
+              <a:t>These phases consu</a:t>
             </a:r>
             <a:r>
               <a:rPr lang="en-US" dirty="0" smtClean="0">
@@ -10283,191 +10276,20 @@
                   <a:schemeClr val="tx1"/>
                 </a:solidFill>
               </a:rPr>
-              <a:t>classification </a:t>
-            </a:r>
-            <a:r>
-              <a:rPr lang="en-US" dirty="0">
-                <a:solidFill>
-                  <a:schemeClr val="tx1"/>
-                </a:solidFill>
-              </a:rPr>
-              <a:t>scheme that </a:t>
-            </a:r>
-            <a:r>
-              <a:rPr lang="en-US" dirty="0" smtClean="0">
-                <a:solidFill>
-                  <a:schemeClr val="tx1"/>
-                </a:solidFill>
-              </a:rPr>
-              <a:t>resulted from </a:t>
-            </a:r>
-            <a:r>
-              <a:rPr lang="en-US" dirty="0">
-                <a:solidFill>
-                  <a:schemeClr val="tx1"/>
-                </a:solidFill>
-              </a:rPr>
-              <a:t>a study of existing publications </a:t>
-            </a:r>
-            <a:r>
-              <a:rPr lang="en-US" dirty="0" smtClean="0">
-                <a:solidFill>
-                  <a:schemeClr val="tx1"/>
-                </a:solidFill>
-              </a:rPr>
-              <a:t>identified </a:t>
-            </a:r>
-            <a:r>
-              <a:rPr lang="en-US" dirty="0">
-                <a:solidFill>
-                  <a:schemeClr val="tx1"/>
-                </a:solidFill>
-              </a:rPr>
-              <a:t>by applying the systematic </a:t>
-            </a:r>
-            <a:r>
-              <a:rPr lang="en-US" dirty="0" smtClean="0">
-                <a:solidFill>
-                  <a:schemeClr val="tx1"/>
-                </a:solidFill>
-              </a:rPr>
-              <a:t>mapping </a:t>
-            </a:r>
-            <a:r>
-              <a:rPr lang="en-US" dirty="0">
-                <a:solidFill>
-                  <a:schemeClr val="tx1"/>
-                </a:solidFill>
-              </a:rPr>
-              <a:t>method. </a:t>
-            </a:r>
-            <a:endParaRPr lang="en-US" dirty="0" smtClean="0">
-              <a:solidFill>
-                <a:schemeClr val="tx1"/>
-              </a:solidFill>
-            </a:endParaRPr>
-          </a:p>
-          <a:p>
-            <a:pPr algn="just"/>
+              <a:t>me resources that must ensure some QoS guarantees to data consumers</a:t>
+            </a:r>
             <a:endParaRPr lang="en-US" dirty="0">
               <a:solidFill>
                 <a:schemeClr val="tx1"/>
               </a:solidFill>
             </a:endParaRPr>
           </a:p>
-          <a:p>
-            <a:pPr algn="just"/>
-            <a:r>
-              <a:rPr lang="en-US" dirty="0" smtClean="0">
-                <a:solidFill>
-                  <a:schemeClr val="tx1"/>
-                </a:solidFill>
-              </a:rPr>
-              <a:t>Our </a:t>
-            </a:r>
-            <a:r>
-              <a:rPr lang="en-US" dirty="0">
-                <a:solidFill>
-                  <a:schemeClr val="tx1"/>
-                </a:solidFill>
-              </a:rPr>
-              <a:t>contribution is the </a:t>
-            </a:r>
-            <a:r>
-              <a:rPr lang="en-US" dirty="0" smtClean="0">
-                <a:solidFill>
-                  <a:schemeClr val="tx1"/>
-                </a:solidFill>
-              </a:rPr>
-              <a:t>definition </a:t>
-            </a:r>
-            <a:r>
-              <a:rPr lang="en-US" dirty="0">
-                <a:solidFill>
-                  <a:schemeClr val="tx1"/>
-                </a:solidFill>
-              </a:rPr>
-              <a:t>of a </a:t>
-            </a:r>
-            <a:r>
-              <a:rPr lang="en-US" dirty="0" smtClean="0">
-                <a:solidFill>
-                  <a:schemeClr val="tx1"/>
-                </a:solidFill>
-              </a:rPr>
-              <a:t>classification </a:t>
-            </a:r>
-            <a:r>
-              <a:rPr lang="en-US" dirty="0">
-                <a:solidFill>
-                  <a:schemeClr val="tx1"/>
-                </a:solidFill>
-              </a:rPr>
-              <a:t>scheme </a:t>
-            </a:r>
-            <a:r>
-              <a:rPr lang="en-US" dirty="0" smtClean="0">
-                <a:solidFill>
-                  <a:schemeClr val="tx1"/>
-                </a:solidFill>
-              </a:rPr>
-              <a:t>that shows </a:t>
-            </a:r>
-            <a:r>
-              <a:rPr lang="en-US" dirty="0">
-                <a:solidFill>
-                  <a:schemeClr val="tx1"/>
-                </a:solidFill>
-              </a:rPr>
-              <a:t>the aspects that characterize a modern vision of data integration done </a:t>
-            </a:r>
-            <a:r>
-              <a:rPr lang="en-US" dirty="0" smtClean="0">
-                <a:solidFill>
-                  <a:schemeClr val="tx1"/>
-                </a:solidFill>
-              </a:rPr>
-              <a:t>in </a:t>
-            </a:r>
-            <a:r>
-              <a:rPr lang="en-US" dirty="0">
-                <a:solidFill>
-                  <a:schemeClr val="tx1"/>
-                </a:solidFill>
-              </a:rPr>
-              <a:t>multi-cloud environments and that can be enhanced by including SLAs in </a:t>
-            </a:r>
-            <a:r>
-              <a:rPr lang="en-US" dirty="0" smtClean="0">
-                <a:solidFill>
-                  <a:schemeClr val="tx1"/>
-                </a:solidFill>
-              </a:rPr>
-              <a:t>its process</a:t>
-            </a:r>
-            <a:r>
-              <a:rPr lang="en-US" dirty="0">
-                <a:solidFill>
-                  <a:schemeClr val="tx1"/>
-                </a:solidFill>
-              </a:rPr>
-              <a:t>.</a:t>
-            </a:r>
-          </a:p>
-          <a:p>
-            <a:pPr algn="just"/>
-            <a:endParaRPr lang="en-US" dirty="0">
-              <a:solidFill>
-                <a:schemeClr val="tx1"/>
-              </a:solidFill>
-            </a:endParaRPr>
-          </a:p>
         </p:txBody>
       </p:sp>
     </p:spTree>
     <p:extLst>
       <p:ext uri="{BB962C8B-B14F-4D97-AF65-F5344CB8AC3E}">
-        <p14:creationId xmlns:p14="http://schemas.microsoft.com/office/powerpoint/2010/main" val="1865980667"/>
+        <p14:creationId xmlns:p14="http://schemas.microsoft.com/office/powerpoint/2010/main" val="1663560043"/>
       </p:ext>
     </p:extLst>
   </p:cSld>
@@ -10485,7 +10307,335 @@
   <p:timing>
     <p:tnLst>
       <p:par>
-        <p:cTn id="1" dur="indefinite" restart="never" nodeType="tmRoot"/>
+        <p:cTn id="1" dur="indefinite" restart="never" nodeType="tmRoot">
+          <p:childTnLst>
+            <p:seq concurrent="1" nextAc="seek">
+              <p:cTn id="2" dur="indefinite" nodeType="mainSeq">
+                <p:childTnLst>
+                  <p:par>
+                    <p:cTn id="3" fill="hold">
+                      <p:stCondLst>
+                        <p:cond delay="indefinite"/>
+                      </p:stCondLst>
+                      <p:childTnLst>
+                        <p:par>
+                          <p:cTn id="4" fill="hold">
+                            <p:stCondLst>
+                              <p:cond delay="0"/>
+                            </p:stCondLst>
+                            <p:childTnLst>
+                              <p:par>
+                                <p:cTn id="5" presetID="10" presetClass="entr" presetSubtype="0" fill="hold" nodeType="clickEffect">
+                                  <p:stCondLst>
+                                    <p:cond delay="0"/>
+                                  </p:stCondLst>
+                                  <p:childTnLst>
+                                    <p:set>
+                                      <p:cBhvr>
+                                        <p:cTn id="6" dur="1" fill="hold">
+                                          <p:stCondLst>
+                                            <p:cond delay="0"/>
+                                          </p:stCondLst>
+                                        </p:cTn>
+                                        <p:tgtEl>
+                                          <p:spTgt spid="3">
+                                            <p:txEl>
+                                              <p:pRg st="2" end="2"/>
+                                            </p:txEl>
+                                          </p:spTgt>
+                                        </p:tgtEl>
+                                        <p:attrNameLst>
+                                          <p:attrName>style.visibility</p:attrName>
+                                        </p:attrNameLst>
+                                      </p:cBhvr>
+                                      <p:to>
+                                        <p:strVal val="visible"/>
+                                      </p:to>
+                                    </p:set>
+                                    <p:animEffect transition="in" filter="fade">
+                                      <p:cBhvr>
+                                        <p:cTn id="7" dur="500"/>
+                                        <p:tgtEl>
+                                          <p:spTgt spid="3">
+                                            <p:txEl>
+                                              <p:pRg st="2" end="2"/>
+                                            </p:txEl>
+                                          </p:spTgt>
+                                        </p:tgtEl>
+                                      </p:cBhvr>
+                                    </p:animEffect>
+                                  </p:childTnLst>
+                                </p:cTn>
+                              </p:par>
+                            </p:childTnLst>
+                          </p:cTn>
+                        </p:par>
+                      </p:childTnLst>
+                    </p:cTn>
+                  </p:par>
+                  <p:par>
+                    <p:cTn id="8" fill="hold">
+                      <p:stCondLst>
+                        <p:cond delay="indefinite"/>
+                      </p:stCondLst>
+                      <p:childTnLst>
+                        <p:par>
+                          <p:cTn id="9" fill="hold">
+                            <p:stCondLst>
+                              <p:cond delay="0"/>
+                            </p:stCondLst>
+                            <p:childTnLst>
+                              <p:par>
+                                <p:cTn id="10" presetID="10" presetClass="entr" presetSubtype="0" fill="hold" nodeType="clickEffect">
+                                  <p:stCondLst>
+                                    <p:cond delay="0"/>
+                                  </p:stCondLst>
+                                  <p:childTnLst>
+                                    <p:set>
+                                      <p:cBhvr>
+                                        <p:cTn id="11" dur="1" fill="hold">
+                                          <p:stCondLst>
+                                            <p:cond delay="0"/>
+                                          </p:stCondLst>
+                                        </p:cTn>
+                                        <p:tgtEl>
+                                          <p:spTgt spid="3">
+                                            <p:txEl>
+                                              <p:pRg st="4" end="4"/>
+                                            </p:txEl>
+                                          </p:spTgt>
+                                        </p:tgtEl>
+                                        <p:attrNameLst>
+                                          <p:attrName>style.visibility</p:attrName>
+                                        </p:attrNameLst>
+                                      </p:cBhvr>
+                                      <p:to>
+                                        <p:strVal val="visible"/>
+                                      </p:to>
+                                    </p:set>
+                                    <p:animEffect transition="in" filter="fade">
+                                      <p:cBhvr>
+                                        <p:cTn id="12" dur="500"/>
+                                        <p:tgtEl>
+                                          <p:spTgt spid="3">
+                                            <p:txEl>
+                                              <p:pRg st="4" end="4"/>
+                                            </p:txEl>
+                                          </p:spTgt>
+                                        </p:tgtEl>
+                                      </p:cBhvr>
+                                    </p:animEffect>
+                                  </p:childTnLst>
+                                </p:cTn>
+                              </p:par>
+                            </p:childTnLst>
+                          </p:cTn>
+                        </p:par>
+                      </p:childTnLst>
+                    </p:cTn>
+                  </p:par>
+                  <p:par>
+                    <p:cTn id="13" fill="hold">
+                      <p:stCondLst>
+                        <p:cond delay="indefinite"/>
+                      </p:stCondLst>
+                      <p:childTnLst>
+                        <p:par>
+                          <p:cTn id="14" fill="hold">
+                            <p:stCondLst>
+                              <p:cond delay="0"/>
+                            </p:stCondLst>
+                            <p:childTnLst>
+                              <p:par>
+                                <p:cTn id="15" presetID="10" presetClass="entr" presetSubtype="0" fill="hold" nodeType="clickEffect">
+                                  <p:stCondLst>
+                                    <p:cond delay="0"/>
+                                  </p:stCondLst>
+                                  <p:childTnLst>
+                                    <p:set>
+                                      <p:cBhvr>
+                                        <p:cTn id="16" dur="1" fill="hold">
+                                          <p:stCondLst>
+                                            <p:cond delay="0"/>
+                                          </p:stCondLst>
+                                        </p:cTn>
+                                        <p:tgtEl>
+                                          <p:spTgt spid="3">
+                                            <p:txEl>
+                                              <p:pRg st="6" end="6"/>
+                                            </p:txEl>
+                                          </p:spTgt>
+                                        </p:tgtEl>
+                                        <p:attrNameLst>
+                                          <p:attrName>style.visibility</p:attrName>
+                                        </p:attrNameLst>
+                                      </p:cBhvr>
+                                      <p:to>
+                                        <p:strVal val="visible"/>
+                                      </p:to>
+                                    </p:set>
+                                    <p:animEffect transition="in" filter="fade">
+                                      <p:cBhvr>
+                                        <p:cTn id="17" dur="500"/>
+                                        <p:tgtEl>
+                                          <p:spTgt spid="3">
+                                            <p:txEl>
+                                              <p:pRg st="6" end="6"/>
+                                            </p:txEl>
+                                          </p:spTgt>
+                                        </p:tgtEl>
+                                      </p:cBhvr>
+                                    </p:animEffect>
+                                  </p:childTnLst>
+                                </p:cTn>
+                              </p:par>
+                            </p:childTnLst>
+                          </p:cTn>
+                        </p:par>
+                      </p:childTnLst>
+                    </p:cTn>
+                  </p:par>
+                  <p:par>
+                    <p:cTn id="18" fill="hold">
+                      <p:stCondLst>
+                        <p:cond delay="indefinite"/>
+                      </p:stCondLst>
+                      <p:childTnLst>
+                        <p:par>
+                          <p:cTn id="19" fill="hold">
+                            <p:stCondLst>
+                              <p:cond delay="0"/>
+                            </p:stCondLst>
+                            <p:childTnLst>
+                              <p:par>
+                                <p:cTn id="20" presetID="10" presetClass="entr" presetSubtype="0" fill="hold" nodeType="clickEffect">
+                                  <p:stCondLst>
+                                    <p:cond delay="0"/>
+                                  </p:stCondLst>
+                                  <p:childTnLst>
+                                    <p:set>
+                                      <p:cBhvr>
+                                        <p:cTn id="21" dur="1" fill="hold">
+                                          <p:stCondLst>
+                                            <p:cond delay="0"/>
+                                          </p:stCondLst>
+                                        </p:cTn>
+                                        <p:tgtEl>
+                                          <p:spTgt spid="3">
+                                            <p:txEl>
+                                              <p:pRg st="8" end="8"/>
+                                            </p:txEl>
+                                          </p:spTgt>
+                                        </p:tgtEl>
+                                        <p:attrNameLst>
+                                          <p:attrName>style.visibility</p:attrName>
+                                        </p:attrNameLst>
+                                      </p:cBhvr>
+                                      <p:to>
+                                        <p:strVal val="visible"/>
+                                      </p:to>
+                                    </p:set>
+                                    <p:animEffect transition="in" filter="fade">
+                                      <p:cBhvr>
+                                        <p:cTn id="22" dur="500"/>
+                                        <p:tgtEl>
+                                          <p:spTgt spid="3">
+                                            <p:txEl>
+                                              <p:pRg st="8" end="8"/>
+                                            </p:txEl>
+                                          </p:spTgt>
+                                        </p:tgtEl>
+                                      </p:cBhvr>
+                                    </p:animEffect>
+                                  </p:childTnLst>
+                                </p:cTn>
+                              </p:par>
+                            </p:childTnLst>
+                          </p:cTn>
+                        </p:par>
+                      </p:childTnLst>
+                    </p:cTn>
+                  </p:par>
+                  <p:par>
+                    <p:cTn id="23" fill="hold">
+                      <p:stCondLst>
+                        <p:cond delay="indefinite"/>
+                      </p:stCondLst>
+                      <p:childTnLst>
+                        <p:par>
+                          <p:cTn id="24" fill="hold">
+                            <p:stCondLst>
+                              <p:cond delay="0"/>
+                            </p:stCondLst>
+                            <p:childTnLst>
+                              <p:par>
+                                <p:cTn id="25" presetID="10" presetClass="entr" presetSubtype="0" fill="hold" nodeType="clickEffect">
+                                  <p:stCondLst>
+                                    <p:cond delay="0"/>
+                                  </p:stCondLst>
+                                  <p:childTnLst>
+                                    <p:set>
+                                      <p:cBhvr>
+                                        <p:cTn id="26" dur="1" fill="hold">
+                                          <p:stCondLst>
+                                            <p:cond delay="0"/>
+                                          </p:stCondLst>
+                                        </p:cTn>
+                                        <p:tgtEl>
+                                          <p:spTgt spid="3">
+                                            <p:txEl>
+                                              <p:pRg st="10" end="10"/>
+                                            </p:txEl>
+                                          </p:spTgt>
+                                        </p:tgtEl>
+                                        <p:attrNameLst>
+                                          <p:attrName>style.visibility</p:attrName>
+                                        </p:attrNameLst>
+                                      </p:cBhvr>
+                                      <p:to>
+                                        <p:strVal val="visible"/>
+                                      </p:to>
+                                    </p:set>
+                                    <p:animEffect transition="in" filter="fade">
+                                      <p:cBhvr>
+                                        <p:cTn id="27" dur="500"/>
+                                        <p:tgtEl>
+                                          <p:spTgt spid="3">
+                                            <p:txEl>
+                                              <p:pRg st="10" end="10"/>
+                                            </p:txEl>
+                                          </p:spTgt>
+                                        </p:tgtEl>
+                                      </p:cBhvr>
+                                    </p:animEffect>
+                                  </p:childTnLst>
+                                </p:cTn>
+                              </p:par>
+                            </p:childTnLst>
+                          </p:cTn>
+                        </p:par>
+                      </p:childTnLst>
+                    </p:cTn>
+                  </p:par>
+                </p:childTnLst>
+              </p:cTn>
+              <p:prevCondLst>
+                <p:cond evt="onPrev" delay="0">
+                  <p:tgtEl>
+                    <p:sldTgt/>
+                  </p:tgtEl>
+                </p:cond>
+              </p:prevCondLst>
+              <p:nextCondLst>
+                <p:cond evt="onNext" delay="0">
+                  <p:tgtEl>
+                    <p:sldTgt/>
+                  </p:tgtEl>
+                </p:cond>
+              </p:nextCondLst>
+            </p:seq>
+          </p:childTnLst>
+        </p:cTn>
       </p:par>
     </p:tnLst>
   </p:timing>
@@ -10561,148 +10711,44 @@
           <a:p>
             <a:pPr algn="just"/>
             <a:r>
-              <a:rPr lang="en-US" dirty="0">
-                <a:solidFill>
-                  <a:schemeClr val="tx1"/>
-                </a:solidFill>
-              </a:rPr>
-              <a:t>W</a:t>
-            </a:r>
-            <a:r>
               <a:rPr lang="en-US" dirty="0" smtClean="0">
                 <a:solidFill>
                   <a:schemeClr val="tx1"/>
                 </a:solidFill>
               </a:rPr>
-              <a:t>e identified </a:t>
-            </a:r>
-            <a:r>
-              <a:rPr lang="en-US" dirty="0">
-                <a:solidFill>
-                  <a:schemeClr val="tx1"/>
-                </a:solidFill>
-              </a:rPr>
-              <a:t>trends and </a:t>
-            </a:r>
+              <a:t>We are currently developing the strategies to better define a SLA extension and data consumers preferences description for guiding data integration in multi-cloud environments</a:t>
+            </a:r>
+          </a:p>
+          <a:p>
+            <a:pPr algn="just"/>
+            <a:endParaRPr lang="en-US" dirty="0" smtClean="0">
+              <a:solidFill>
+                <a:schemeClr val="tx1"/>
+              </a:solidFill>
+            </a:endParaRPr>
+          </a:p>
+          <a:p>
+            <a:pPr algn="just"/>
             <a:r>
               <a:rPr lang="en-US" dirty="0" smtClean="0">
                 <a:solidFill>
                   <a:schemeClr val="tx1"/>
                 </a:solidFill>
               </a:rPr>
-              <a:t>open issues </a:t>
-            </a:r>
-            <a:r>
-              <a:rPr lang="en-US" dirty="0">
-                <a:solidFill>
-                  <a:schemeClr val="tx1"/>
-                </a:solidFill>
-              </a:rPr>
-              <a:t>in our research topic and proposed the general lines of an original </a:t>
-            </a:r>
-            <a:r>
-              <a:rPr lang="en-US" dirty="0" smtClean="0">
-                <a:solidFill>
-                  <a:schemeClr val="tx1"/>
-                </a:solidFill>
-              </a:rPr>
-              <a:t>data integration </a:t>
-            </a:r>
-            <a:r>
-              <a:rPr lang="en-US" dirty="0">
-                <a:solidFill>
-                  <a:schemeClr val="tx1"/>
-                </a:solidFill>
-              </a:rPr>
-              <a:t>solution. </a:t>
-            </a:r>
-            <a:endParaRPr lang="en-US" dirty="0" smtClean="0">
-              <a:solidFill>
-                <a:schemeClr val="tx1"/>
-              </a:solidFill>
-            </a:endParaRPr>
-          </a:p>
-          <a:p>
-            <a:pPr algn="just"/>
+              <a:t>We believe that it is possible to add and enhance the quality of data integration by including SLAs </a:t>
+            </a:r>
             <a:endParaRPr lang="en-US" dirty="0">
               <a:solidFill>
                 <a:schemeClr val="tx1"/>
               </a:solidFill>
             </a:endParaRPr>
           </a:p>
-          <a:p>
-            <a:pPr algn="just"/>
-            <a:r>
-              <a:rPr lang="en-US" dirty="0" smtClean="0">
-                <a:solidFill>
-                  <a:schemeClr val="tx1"/>
-                </a:solidFill>
-              </a:rPr>
-              <a:t>We </a:t>
-            </a:r>
-            <a:r>
-              <a:rPr lang="en-US" dirty="0">
-                <a:solidFill>
-                  <a:schemeClr val="tx1"/>
-                </a:solidFill>
-              </a:rPr>
-              <a:t>are also developing the strategies to better </a:t>
-            </a:r>
-            <a:r>
-              <a:rPr lang="en-US" dirty="0" smtClean="0">
-                <a:solidFill>
-                  <a:schemeClr val="tx1"/>
-                </a:solidFill>
-              </a:rPr>
-              <a:t>define </a:t>
-            </a:r>
-            <a:r>
-              <a:rPr lang="en-US" dirty="0">
-                <a:solidFill>
-                  <a:schemeClr val="tx1"/>
-                </a:solidFill>
-              </a:rPr>
-              <a:t>a </a:t>
-            </a:r>
-            <a:r>
-              <a:rPr lang="en-US" dirty="0" smtClean="0">
-                <a:solidFill>
-                  <a:schemeClr val="tx1"/>
-                </a:solidFill>
-              </a:rPr>
-              <a:t>SLA extension </a:t>
-            </a:r>
-            <a:r>
-              <a:rPr lang="en-US" dirty="0">
-                <a:solidFill>
-                  <a:schemeClr val="tx1"/>
-                </a:solidFill>
-              </a:rPr>
-              <a:t>and data consumers preferences description for guiding data </a:t>
-            </a:r>
-            <a:r>
-              <a:rPr lang="en-US" dirty="0" smtClean="0">
-                <a:solidFill>
-                  <a:schemeClr val="tx1"/>
-                </a:solidFill>
-              </a:rPr>
-              <a:t>integration </a:t>
-            </a:r>
-            <a:r>
-              <a:rPr lang="en-US" dirty="0">
-                <a:solidFill>
-                  <a:schemeClr val="tx1"/>
-                </a:solidFill>
-              </a:rPr>
-              <a:t>in multi-cloud environments.</a:t>
-            </a:r>
-          </a:p>
         </p:txBody>
       </p:sp>
     </p:spTree>
     <p:extLst>
       <p:ext uri="{BB962C8B-B14F-4D97-AF65-F5344CB8AC3E}">
-        <p14:creationId xmlns:p14="http://schemas.microsoft.com/office/powerpoint/2010/main" val="1663560043"/>
+        <p14:creationId xmlns:p14="http://schemas.microsoft.com/office/powerpoint/2010/main" val="4040582551"/>
       </p:ext>
     </p:extLst>
   </p:cSld>
@@ -10728,682 +10774,6 @@
 </file>
 
 <file path=ppt/slides/slide25.xml><?xml version="1.0" encoding="utf-8"?>
-<p:sld xmlns:a="http://schemas.openxmlformats.org/drawingml/2006/main" xmlns:r="http://schemas.openxmlformats.org/officeDocument/2006/relationships" xmlns:p="http://schemas.openxmlformats.org/presentationml/2006/main">
-  <p:cSld>
-    <p:spTree>
-      <p:nvGrpSpPr>
-        <p:cNvPr id="1" name=""/>
-        <p:cNvGrpSpPr/>
-        <p:nvPr/>
-      </p:nvGrpSpPr>
-      <p:grpSpPr>
-        <a:xfrm>
-          <a:off x="0" y="0"/>
-          <a:ext cx="0" cy="0"/>
-          <a:chOff x="0" y="0"/>
-          <a:chExt cx="0" cy="0"/>
-        </a:xfrm>
-      </p:grpSpPr>
-      <p:sp>
-        <p:nvSpPr>
-          <p:cNvPr id="2" name="Title 1"/>
-          <p:cNvSpPr>
-            <a:spLocks noGrp="1"/>
-          </p:cNvSpPr>
-          <p:nvPr>
-            <p:ph type="title"/>
-          </p:nvPr>
-        </p:nvSpPr>
-        <p:spPr/>
-        <p:txBody>
-          <a:bodyPr>
-            <a:normAutofit/>
-          </a:bodyPr>
-          <a:lstStyle/>
-          <a:p>
-            <a:r>
-              <a:rPr lang="en-US" dirty="0" smtClean="0"/>
-              <a:t>References</a:t>
-            </a:r>
-            <a:endParaRPr lang="en-US" dirty="0"/>
-          </a:p>
-        </p:txBody>
-      </p:sp>
-      <p:sp>
-        <p:nvSpPr>
-          <p:cNvPr id="3" name="Content Placeholder 2"/>
-          <p:cNvSpPr>
-            <a:spLocks noGrp="1"/>
-          </p:cNvSpPr>
-          <p:nvPr>
-            <p:ph idx="1"/>
-          </p:nvPr>
-        </p:nvSpPr>
-        <p:spPr>
-          <a:xfrm>
-            <a:off x="457200" y="1769016"/>
-            <a:ext cx="8229600" cy="4525963"/>
-          </a:xfrm>
-        </p:spPr>
-        <p:txBody>
-          <a:bodyPr>
-            <a:normAutofit fontScale="62500" lnSpcReduction="20000"/>
-          </a:bodyPr>
-          <a:lstStyle/>
-          <a:p>
-            <a:pPr marL="457200" indent="-457200" algn="just">
-              <a:buFont typeface="+mj-lt"/>
-              <a:buAutoNum type="arabicPeriod"/>
-            </a:pPr>
-            <a:r>
-              <a:rPr lang="en-US" dirty="0" smtClean="0">
-                <a:solidFill>
-                  <a:schemeClr val="tx1"/>
-                </a:solidFill>
-              </a:rPr>
-              <a:t>Mohamad </a:t>
-            </a:r>
-            <a:r>
-              <a:rPr lang="en-US" dirty="0" err="1">
-                <a:solidFill>
-                  <a:schemeClr val="tx1"/>
-                </a:solidFill>
-              </a:rPr>
-              <a:t>Hamze</a:t>
-            </a:r>
-            <a:r>
-              <a:rPr lang="en-US" dirty="0">
-                <a:solidFill>
-                  <a:schemeClr val="tx1"/>
-                </a:solidFill>
-              </a:rPr>
-              <a:t>, Nader </a:t>
-            </a:r>
-            <a:r>
-              <a:rPr lang="en-US" dirty="0" err="1">
-                <a:solidFill>
-                  <a:schemeClr val="tx1"/>
-                </a:solidFill>
-              </a:rPr>
-              <a:t>Mbarek</a:t>
-            </a:r>
-            <a:r>
-              <a:rPr lang="en-US" dirty="0">
-                <a:solidFill>
-                  <a:schemeClr val="tx1"/>
-                </a:solidFill>
-              </a:rPr>
-              <a:t>, and Olivier </a:t>
-            </a:r>
-            <a:r>
-              <a:rPr lang="en-US" dirty="0" err="1">
-                <a:solidFill>
-                  <a:schemeClr val="tx1"/>
-                </a:solidFill>
-              </a:rPr>
-              <a:t>Togni</a:t>
-            </a:r>
-            <a:r>
-              <a:rPr lang="en-US" dirty="0">
-                <a:solidFill>
-                  <a:schemeClr val="tx1"/>
-                </a:solidFill>
-              </a:rPr>
-              <a:t>. Self-establishing a </a:t>
-            </a:r>
-            <a:r>
-              <a:rPr lang="en-US" dirty="0" smtClean="0">
-                <a:solidFill>
-                  <a:schemeClr val="tx1"/>
-                </a:solidFill>
-              </a:rPr>
-              <a:t>Service Level </a:t>
-            </a:r>
-            <a:r>
-              <a:rPr lang="en-US" dirty="0">
-                <a:solidFill>
-                  <a:schemeClr val="tx1"/>
-                </a:solidFill>
-              </a:rPr>
-              <a:t>Agreement within autonomic cloud networking environment. In 2014 </a:t>
-            </a:r>
-            <a:r>
-              <a:rPr lang="en-US" dirty="0" smtClean="0">
-                <a:solidFill>
-                  <a:schemeClr val="tx1"/>
-                </a:solidFill>
-              </a:rPr>
-              <a:t>IEEE Network </a:t>
-            </a:r>
-            <a:r>
-              <a:rPr lang="en-US" dirty="0">
-                <a:solidFill>
-                  <a:schemeClr val="tx1"/>
-                </a:solidFill>
-              </a:rPr>
-              <a:t>Operations and Management Symposium (NOMS), pages </a:t>
-            </a:r>
-            <a:r>
-              <a:rPr lang="en-US" dirty="0" smtClean="0">
-                <a:solidFill>
-                  <a:schemeClr val="tx1"/>
-                </a:solidFill>
-              </a:rPr>
-              <a:t>1-4</a:t>
-            </a:r>
-            <a:r>
-              <a:rPr lang="en-US" dirty="0">
-                <a:solidFill>
-                  <a:schemeClr val="tx1"/>
-                </a:solidFill>
-              </a:rPr>
-              <a:t>. IEEE, </a:t>
-            </a:r>
-            <a:r>
-              <a:rPr lang="en-US" dirty="0" smtClean="0">
-                <a:solidFill>
-                  <a:schemeClr val="tx1"/>
-                </a:solidFill>
-              </a:rPr>
-              <a:t>May 2014.</a:t>
-            </a:r>
-          </a:p>
-          <a:p>
-            <a:pPr marL="457200" indent="-457200" algn="just">
-              <a:buFont typeface="+mj-lt"/>
-              <a:buAutoNum type="arabicPeriod"/>
-            </a:pPr>
-            <a:endParaRPr lang="en-US" dirty="0">
-              <a:solidFill>
-                <a:schemeClr val="tx1"/>
-              </a:solidFill>
-            </a:endParaRPr>
-          </a:p>
-          <a:p>
-            <a:pPr marL="457200" indent="-457200" algn="just">
-              <a:buFont typeface="+mj-lt"/>
-              <a:buAutoNum type="arabicPeriod"/>
-            </a:pPr>
-            <a:r>
-              <a:rPr lang="pt-BR" dirty="0" smtClean="0">
-                <a:solidFill>
-                  <a:schemeClr val="tx1"/>
-                </a:solidFill>
-              </a:rPr>
-              <a:t>Carlos </a:t>
-            </a:r>
-            <a:r>
-              <a:rPr lang="pt-BR" dirty="0">
-                <a:solidFill>
-                  <a:schemeClr val="tx1"/>
-                </a:solidFill>
-              </a:rPr>
-              <a:t>Pedrinaci, Jorge Cardoso, and Torsten Leidig. Linked USDL: A </a:t>
-            </a:r>
-            <a:r>
-              <a:rPr lang="pt-BR" dirty="0" smtClean="0">
-                <a:solidFill>
-                  <a:schemeClr val="tx1"/>
-                </a:solidFill>
-              </a:rPr>
-              <a:t>vocabulary </a:t>
-            </a:r>
-            <a:r>
-              <a:rPr lang="en-US" dirty="0" smtClean="0">
-                <a:solidFill>
-                  <a:schemeClr val="tx1"/>
-                </a:solidFill>
-              </a:rPr>
-              <a:t>for </a:t>
-            </a:r>
-            <a:r>
-              <a:rPr lang="en-US" dirty="0">
-                <a:solidFill>
-                  <a:schemeClr val="tx1"/>
-                </a:solidFill>
-              </a:rPr>
-              <a:t>web-scale service trading. In The Semantic Web: Trends and Challenges - </a:t>
-            </a:r>
-            <a:r>
-              <a:rPr lang="en-US" dirty="0" smtClean="0">
-                <a:solidFill>
-                  <a:schemeClr val="tx1"/>
-                </a:solidFill>
-              </a:rPr>
-              <a:t>11</a:t>
-            </a:r>
-            <a:r>
-              <a:rPr lang="en-US" baseline="30000" dirty="0" smtClean="0">
-                <a:solidFill>
-                  <a:schemeClr val="tx1"/>
-                </a:solidFill>
-              </a:rPr>
-              <a:t>th</a:t>
-            </a:r>
-            <a:r>
-              <a:rPr lang="en-US" dirty="0" smtClean="0">
-                <a:solidFill>
-                  <a:schemeClr val="tx1"/>
-                </a:solidFill>
-              </a:rPr>
-              <a:t> International </a:t>
-            </a:r>
-            <a:r>
-              <a:rPr lang="en-US" dirty="0">
-                <a:solidFill>
-                  <a:schemeClr val="tx1"/>
-                </a:solidFill>
-              </a:rPr>
-              <a:t>Conference, ESWC 2014, </a:t>
-            </a:r>
-            <a:r>
-              <a:rPr lang="en-US" dirty="0" err="1">
-                <a:solidFill>
-                  <a:schemeClr val="tx1"/>
-                </a:solidFill>
-              </a:rPr>
-              <a:t>Anissaras</a:t>
-            </a:r>
-            <a:r>
-              <a:rPr lang="en-US" dirty="0">
-                <a:solidFill>
-                  <a:schemeClr val="tx1"/>
-                </a:solidFill>
-              </a:rPr>
-              <a:t>, Crete, Greece, May 25-29, </a:t>
-            </a:r>
-            <a:r>
-              <a:rPr lang="en-US" dirty="0" smtClean="0">
-                <a:solidFill>
-                  <a:schemeClr val="tx1"/>
-                </a:solidFill>
-              </a:rPr>
-              <a:t>2014. Proceedings</a:t>
-            </a:r>
-            <a:r>
-              <a:rPr lang="en-US" dirty="0">
-                <a:solidFill>
-                  <a:schemeClr val="tx1"/>
-                </a:solidFill>
-              </a:rPr>
-              <a:t>, pages 68{82, 2014</a:t>
-            </a:r>
-            <a:r>
-              <a:rPr lang="en-US" dirty="0" smtClean="0">
-                <a:solidFill>
-                  <a:schemeClr val="tx1"/>
-                </a:solidFill>
-              </a:rPr>
-              <a:t>.</a:t>
-            </a:r>
-          </a:p>
-          <a:p>
-            <a:pPr marL="457200" indent="-457200" algn="just">
-              <a:buFont typeface="+mj-lt"/>
-              <a:buAutoNum type="arabicPeriod"/>
-            </a:pPr>
-            <a:endParaRPr lang="en-US" dirty="0">
-              <a:solidFill>
-                <a:schemeClr val="tx1"/>
-              </a:solidFill>
-            </a:endParaRPr>
-          </a:p>
-          <a:p>
-            <a:pPr marL="457200" indent="-457200" algn="just">
-              <a:buFont typeface="+mj-lt"/>
-              <a:buAutoNum type="arabicPeriod"/>
-            </a:pPr>
-            <a:r>
-              <a:rPr lang="en-US" dirty="0" smtClean="0">
-                <a:solidFill>
-                  <a:schemeClr val="tx1"/>
-                </a:solidFill>
-              </a:rPr>
-              <a:t>Kai </a:t>
-            </a:r>
-            <a:r>
-              <a:rPr lang="en-US" dirty="0">
-                <a:solidFill>
-                  <a:schemeClr val="tx1"/>
-                </a:solidFill>
-              </a:rPr>
-              <a:t>Petersen, Robert </a:t>
-            </a:r>
-            <a:r>
-              <a:rPr lang="en-US" dirty="0" err="1">
-                <a:solidFill>
-                  <a:schemeClr val="tx1"/>
-                </a:solidFill>
-              </a:rPr>
-              <a:t>Feldt</a:t>
-            </a:r>
-            <a:r>
-              <a:rPr lang="en-US" dirty="0">
-                <a:solidFill>
-                  <a:schemeClr val="tx1"/>
-                </a:solidFill>
-              </a:rPr>
-              <a:t>, </a:t>
-            </a:r>
-            <a:r>
-              <a:rPr lang="en-US" dirty="0" err="1">
-                <a:solidFill>
-                  <a:schemeClr val="tx1"/>
-                </a:solidFill>
-              </a:rPr>
-              <a:t>Shahid</a:t>
-            </a:r>
-            <a:r>
-              <a:rPr lang="en-US" dirty="0">
-                <a:solidFill>
-                  <a:schemeClr val="tx1"/>
-                </a:solidFill>
-              </a:rPr>
-              <a:t> </a:t>
-            </a:r>
-            <a:r>
-              <a:rPr lang="en-US" dirty="0" err="1">
-                <a:solidFill>
-                  <a:schemeClr val="tx1"/>
-                </a:solidFill>
-              </a:rPr>
-              <a:t>Mujtaba</a:t>
-            </a:r>
-            <a:r>
-              <a:rPr lang="en-US" dirty="0">
-                <a:solidFill>
-                  <a:schemeClr val="tx1"/>
-                </a:solidFill>
-              </a:rPr>
-              <a:t>, and Michael </a:t>
-            </a:r>
-            <a:r>
-              <a:rPr lang="en-US" dirty="0" err="1">
-                <a:solidFill>
-                  <a:schemeClr val="tx1"/>
-                </a:solidFill>
-              </a:rPr>
-              <a:t>Mattsson</a:t>
-            </a:r>
-            <a:r>
-              <a:rPr lang="en-US" dirty="0">
-                <a:solidFill>
-                  <a:schemeClr val="tx1"/>
-                </a:solidFill>
-              </a:rPr>
-              <a:t>. </a:t>
-            </a:r>
-            <a:r>
-              <a:rPr lang="en-US" dirty="0" smtClean="0">
-                <a:solidFill>
-                  <a:schemeClr val="tx1"/>
-                </a:solidFill>
-              </a:rPr>
-              <a:t>Systematic mapping </a:t>
-            </a:r>
-            <a:r>
-              <a:rPr lang="en-US" dirty="0">
-                <a:solidFill>
-                  <a:schemeClr val="tx1"/>
-                </a:solidFill>
-              </a:rPr>
-              <a:t>studies in software engineering. In Proceedings of the 12th </a:t>
-            </a:r>
-            <a:r>
-              <a:rPr lang="en-US" dirty="0" smtClean="0">
-                <a:solidFill>
-                  <a:schemeClr val="tx1"/>
-                </a:solidFill>
-              </a:rPr>
-              <a:t>International Conference </a:t>
-            </a:r>
-            <a:r>
-              <a:rPr lang="en-US" dirty="0">
-                <a:solidFill>
-                  <a:schemeClr val="tx1"/>
-                </a:solidFill>
-              </a:rPr>
-              <a:t>on Evaluation and Assessment in Software Engineering, EASE'08, </a:t>
-            </a:r>
-            <a:r>
-              <a:rPr lang="en-US" dirty="0" smtClean="0">
-                <a:solidFill>
-                  <a:schemeClr val="tx1"/>
-                </a:solidFill>
-              </a:rPr>
-              <a:t>pages 68-77, </a:t>
-            </a:r>
-            <a:r>
-              <a:rPr lang="en-US" dirty="0">
-                <a:solidFill>
-                  <a:schemeClr val="tx1"/>
-                </a:solidFill>
-              </a:rPr>
-              <a:t>Swinton, UK, UK, 2008. British Computer Society</a:t>
-            </a:r>
-            <a:r>
-              <a:rPr lang="en-US" dirty="0" smtClean="0">
-                <a:solidFill>
-                  <a:schemeClr val="tx1"/>
-                </a:solidFill>
-              </a:rPr>
-              <a:t>.</a:t>
-            </a:r>
-          </a:p>
-          <a:p>
-            <a:pPr marL="457200" indent="-457200" algn="just">
-              <a:buFont typeface="+mj-lt"/>
-              <a:buAutoNum type="arabicPeriod"/>
-            </a:pPr>
-            <a:endParaRPr lang="en-US" dirty="0">
-              <a:solidFill>
-                <a:schemeClr val="tx1"/>
-              </a:solidFill>
-            </a:endParaRPr>
-          </a:p>
-          <a:p>
-            <a:pPr marL="457200" indent="-457200" algn="just">
-              <a:buFont typeface="+mj-lt"/>
-              <a:buAutoNum type="arabicPeriod"/>
-            </a:pPr>
-            <a:r>
-              <a:rPr lang="en-US" dirty="0" err="1" smtClean="0">
-                <a:solidFill>
-                  <a:schemeClr val="tx1"/>
-                </a:solidFill>
-              </a:rPr>
-              <a:t>Pramod</a:t>
-            </a:r>
-            <a:r>
-              <a:rPr lang="en-US" dirty="0" smtClean="0">
-                <a:solidFill>
-                  <a:schemeClr val="tx1"/>
-                </a:solidFill>
-              </a:rPr>
-              <a:t> </a:t>
-            </a:r>
-            <a:r>
-              <a:rPr lang="en-US" dirty="0">
-                <a:solidFill>
-                  <a:schemeClr val="tx1"/>
-                </a:solidFill>
-              </a:rPr>
-              <a:t>J </a:t>
-            </a:r>
-            <a:r>
-              <a:rPr lang="en-US" dirty="0" err="1">
-                <a:solidFill>
-                  <a:schemeClr val="tx1"/>
-                </a:solidFill>
-              </a:rPr>
-              <a:t>Sadalage</a:t>
-            </a:r>
-            <a:r>
-              <a:rPr lang="en-US" dirty="0">
-                <a:solidFill>
-                  <a:schemeClr val="tx1"/>
-                </a:solidFill>
-              </a:rPr>
-              <a:t> and Martin Fowler. NoSQL distilled: a brief guide to the </a:t>
-            </a:r>
-            <a:r>
-              <a:rPr lang="en-US" dirty="0" smtClean="0">
-                <a:solidFill>
-                  <a:schemeClr val="tx1"/>
-                </a:solidFill>
-              </a:rPr>
-              <a:t>emerging </a:t>
-            </a:r>
-            <a:r>
-              <a:rPr lang="en-US" dirty="0">
-                <a:solidFill>
-                  <a:schemeClr val="tx1"/>
-                </a:solidFill>
-              </a:rPr>
-              <a:t>world of polyglot persistence. Pearson Education, 2012</a:t>
-            </a:r>
-            <a:r>
-              <a:rPr lang="en-US" dirty="0" smtClean="0">
-                <a:solidFill>
-                  <a:schemeClr val="tx1"/>
-                </a:solidFill>
-              </a:rPr>
-              <a:t>.</a:t>
-            </a:r>
-          </a:p>
-          <a:p>
-            <a:pPr marL="457200" indent="-457200" algn="just">
-              <a:buFont typeface="+mj-lt"/>
-              <a:buAutoNum type="arabicPeriod"/>
-            </a:pPr>
-            <a:endParaRPr lang="en-US" dirty="0">
-              <a:solidFill>
-                <a:schemeClr val="tx1"/>
-              </a:solidFill>
-            </a:endParaRPr>
-          </a:p>
-          <a:p>
-            <a:pPr marL="457200" indent="-457200" algn="just">
-              <a:buFont typeface="+mj-lt"/>
-              <a:buAutoNum type="arabicPeriod"/>
-            </a:pPr>
-            <a:r>
-              <a:rPr lang="en-US" dirty="0" smtClean="0">
-                <a:solidFill>
-                  <a:schemeClr val="tx1"/>
-                </a:solidFill>
-              </a:rPr>
-              <a:t>Stephen </a:t>
-            </a:r>
-            <a:r>
-              <a:rPr lang="en-US" dirty="0">
-                <a:solidFill>
-                  <a:schemeClr val="tx1"/>
-                </a:solidFill>
-              </a:rPr>
-              <a:t>S. </a:t>
-            </a:r>
-            <a:r>
-              <a:rPr lang="en-US" dirty="0" err="1">
-                <a:solidFill>
-                  <a:schemeClr val="tx1"/>
-                </a:solidFill>
-              </a:rPr>
-              <a:t>Yau</a:t>
-            </a:r>
-            <a:r>
-              <a:rPr lang="en-US" dirty="0">
-                <a:solidFill>
-                  <a:schemeClr val="tx1"/>
-                </a:solidFill>
-              </a:rPr>
-              <a:t> and Yin </a:t>
-            </a:r>
-            <a:r>
-              <a:rPr lang="en-US" dirty="0" err="1">
-                <a:solidFill>
-                  <a:schemeClr val="tx1"/>
-                </a:solidFill>
-              </a:rPr>
-              <a:t>Yin</a:t>
-            </a:r>
-            <a:r>
-              <a:rPr lang="en-US" dirty="0">
-                <a:solidFill>
-                  <a:schemeClr val="tx1"/>
-                </a:solidFill>
-              </a:rPr>
-              <a:t>. A privacy preserving repository for data </a:t>
-            </a:r>
-            <a:r>
-              <a:rPr lang="en-US" dirty="0" smtClean="0">
-                <a:solidFill>
-                  <a:schemeClr val="tx1"/>
-                </a:solidFill>
-              </a:rPr>
-              <a:t>integration across </a:t>
-            </a:r>
-            <a:r>
-              <a:rPr lang="en-US" dirty="0">
-                <a:solidFill>
-                  <a:schemeClr val="tx1"/>
-                </a:solidFill>
-              </a:rPr>
-              <a:t>data sharing services. IEEE T. Services Computing, </a:t>
-            </a:r>
-            <a:r>
-              <a:rPr lang="en-US" dirty="0" smtClean="0">
-                <a:solidFill>
-                  <a:schemeClr val="tx1"/>
-                </a:solidFill>
-              </a:rPr>
-              <a:t>1(3):130-140</a:t>
-            </a:r>
-            <a:r>
-              <a:rPr lang="en-US" dirty="0">
-                <a:solidFill>
-                  <a:schemeClr val="tx1"/>
-                </a:solidFill>
-              </a:rPr>
-              <a:t>, 2008.</a:t>
-            </a:r>
-            <a:endParaRPr lang="en-US" dirty="0" smtClean="0">
-              <a:solidFill>
-                <a:schemeClr val="tx1"/>
-              </a:solidFill>
-            </a:endParaRPr>
-          </a:p>
-        </p:txBody>
-      </p:sp>
-    </p:spTree>
-    <p:extLst>
-      <p:ext uri="{BB962C8B-B14F-4D97-AF65-F5344CB8AC3E}">
-        <p14:creationId xmlns:p14="http://schemas.microsoft.com/office/powerpoint/2010/main" val="387860288"/>
-      </p:ext>
-    </p:extLst>
-  </p:cSld>
-  <p:clrMapOvr>
-    <a:masterClrMapping/>
-  </p:clrMapOvr>
-  <mc:AlternateContent xmlns:mc="http://schemas.openxmlformats.org/markup-compatibility/2006" xmlns:p14="http://schemas.microsoft.com/office/powerpoint/2010/main">
-    <mc:Choice Requires="p14">
-      <p:transition spd="slow" p14:dur="2000"/>
-    </mc:Choice>
-    <mc:Fallback xmlns="">
-      <p:transition xmlns:p14="http://schemas.microsoft.com/office/powerpoint/2010/main" spd="slow"/>
-    </mc:Fallback>
-  </mc:AlternateContent>
-  <p:timing>
-    <p:tnLst>
-      <p:par>
-        <p:cTn id="1" dur="indefinite" restart="never" nodeType="tmRoot"/>
-      </p:par>
-    </p:tnLst>
-  </p:timing>
-</p:sld>
-</file>
-
-<file path=ppt/slides/slide26.xml><?xml version="1.0" encoding="utf-8"?>
 <p:sld xmlns:a="http://schemas.openxmlformats.org/drawingml/2006/main" xmlns:r="http://schemas.openxmlformats.org/officeDocument/2006/relationships" xmlns:p="http://schemas.openxmlformats.org/presentationml/2006/main">
   <p:cSld>
     <p:spTree>
@@ -12156,15 +11526,7 @@
                   <a:schemeClr val="tx1"/>
                 </a:solidFill>
               </a:rPr>
-              <a:t>In cloud scenario, quality aspects defined and agreed between service providers and service customers through cont</a:t>
-            </a:r>
-            <a:r>
-              <a:rPr lang="en-US" dirty="0" smtClean="0">
-                <a:solidFill>
-                  <a:schemeClr val="tx1"/>
-                </a:solidFill>
-              </a:rPr>
-              <a:t>racts</a:t>
+              <a:t>In cloud scenario, quality aspects defined and agreed between service providers and service customers through contracts</a:t>
             </a:r>
           </a:p>
           <a:p>
@@ -17809,6 +17171,24 @@
 </file>
 
 <file path=customXml/item1.xml><?xml version="1.0" encoding="utf-8"?>
+<p:properties xmlns:p="http://schemas.microsoft.com/office/2006/metadata/properties" xmlns:xsi="http://www.w3.org/2001/XMLSchema-instance" xmlns:pc="http://schemas.microsoft.com/office/infopath/2007/PartnerControls">
+  <documentManagement>
+    <_Version xmlns="http://schemas.microsoft.com/sharepoint/v3/fields" xsi:nil="true"/>
+    <_Status xmlns="http://schemas.microsoft.com/sharepoint/v3/fields">Not Started</_Status>
+  </documentManagement>
+</p:properties>
+</file>
+
+<file path=customXml/item2.xml><?xml version="1.0" encoding="utf-8"?>
+<?mso-contentType ?>
+<FormTemplates xmlns="http://schemas.microsoft.com/sharepoint/v3/contenttype/forms">
+  <Display>DocumentLibraryForm</Display>
+  <Edit>DocumentLibraryForm</Edit>
+  <New>DocumentLibraryForm</New>
+</FormTemplates>
+</file>
+
+<file path=customXml/item3.xml><?xml version="1.0" encoding="utf-8"?>
 <ct:contentTypeSchema xmlns:ct="http://schemas.microsoft.com/office/2006/metadata/contentType" xmlns:ma="http://schemas.microsoft.com/office/2006/metadata/properties/metaAttributes" ct:_="" ma:_="" ma:contentTypeName="Document" ma:contentTypeID="0x0101000DE64AEEDD9B7A4D93545ACBE97D4615" ma:contentTypeVersion="2" ma:contentTypeDescription="Create a new document." ma:contentTypeScope="" ma:versionID="f49002b78e3a4a71b814eef46a983816">
   <xsd:schema xmlns:xsd="http://www.w3.org/2001/XMLSchema" xmlns:xs="http://www.w3.org/2001/XMLSchema" xmlns:p="http://schemas.microsoft.com/office/2006/metadata/properties" xmlns:ns2="http://schemas.microsoft.com/sharepoint/v3/fields" targetNamespace="http://schemas.microsoft.com/office/2006/metadata/properties" ma:root="true" ma:fieldsID="38f6db2dd0d9a0cf6a8dc37be32b365b" ns2:_="">
     <xsd:import namespace="http://schemas.microsoft.com/sharepoint/v3/fields"/>
@@ -17952,25 +17332,25 @@
 </ct:contentTypeSchema>
 </file>
 
-<file path=customXml/item2.xml><?xml version="1.0" encoding="utf-8"?>
-<?mso-contentType ?>
-<FormTemplates xmlns="http://schemas.microsoft.com/sharepoint/v3/contenttype/forms">
-  <Display>DocumentLibraryForm</Display>
-  <Edit>DocumentLibraryForm</Edit>
-  <New>DocumentLibraryForm</New>
-</FormTemplates>
+<file path=customXml/itemProps1.xml><?xml version="1.0" encoding="utf-8"?>
+<ds:datastoreItem xmlns:ds="http://schemas.openxmlformats.org/officeDocument/2006/customXml" ds:itemID="{7B6F2769-7194-4217-93D3-3AF3A4742282}">
+  <ds:schemaRefs>
+    <ds:schemaRef ds:uri="http://schemas.microsoft.com/office/2006/metadata/properties"/>
+    <ds:schemaRef ds:uri="http://schemas.microsoft.com/office/infopath/2007/PartnerControls"/>
+    <ds:schemaRef ds:uri="http://schemas.microsoft.com/sharepoint/v3/fields"/>
+  </ds:schemaRefs>
+</ds:datastoreItem>
 </file>
 
-<file path=customXml/item3.xml><?xml version="1.0" encoding="utf-8"?>
-<p:properties xmlns:p="http://schemas.microsoft.com/office/2006/metadata/properties" xmlns:xsi="http://www.w3.org/2001/XMLSchema-instance" xmlns:pc="http://schemas.microsoft.com/office/infopath/2007/PartnerControls">
-  <documentManagement>
-    <_Version xmlns="http://schemas.microsoft.com/sharepoint/v3/fields" xsi:nil="true"/>
-    <_Status xmlns="http://schemas.microsoft.com/sharepoint/v3/fields">Not Started</_Status>
-  </documentManagement>
-</p:properties>
+<file path=customXml/itemProps2.xml><?xml version="1.0" encoding="utf-8"?>
+<ds:datastoreItem xmlns:ds="http://schemas.openxmlformats.org/officeDocument/2006/customXml" ds:itemID="{87D2A1B0-FF3E-4009-940D-AED0EB70AA20}">
+  <ds:schemaRefs>
+    <ds:schemaRef ds:uri="http://schemas.microsoft.com/sharepoint/v3/contenttype/forms"/>
+  </ds:schemaRefs>
+</ds:datastoreItem>
 </file>
 
-<file path=customXml/itemProps1.xml><?xml version="1.0" encoding="utf-8"?>
+<file path=customXml/itemProps3.xml><?xml version="1.0" encoding="utf-8"?>
 <ds:datastoreItem xmlns:ds="http://schemas.openxmlformats.org/officeDocument/2006/customXml" ds:itemID="{E4214858-785C-42F7-BE66-6D0E79395FC8}">
   <ds:schemaRefs>
     <ds:schemaRef ds:uri="http://schemas.microsoft.com/office/2006/metadata/contentType"/>
@@ -17986,22 +17366,4 @@
     <ds:schemaRef ds:uri="http://schemas.microsoft.com/internal/obd"/>
   </ds:schemaRefs>
 </ds:datastoreItem>
-</file>
-
-<file path=customXml/itemProps2.xml><?xml version="1.0" encoding="utf-8"?>
-<ds:datastoreItem xmlns:ds="http://schemas.openxmlformats.org/officeDocument/2006/customXml" ds:itemID="{87D2A1B0-FF3E-4009-940D-AED0EB70AA20}">
-  <ds:schemaRefs>
-    <ds:schemaRef ds:uri="http://schemas.microsoft.com/sharepoint/v3/contenttype/forms"/>
-  </ds:schemaRefs>
-</ds:datastoreItem>
-</file>
-
-<file path=customXml/itemProps3.xml><?xml version="1.0" encoding="utf-8"?>
-<ds:datastoreItem xmlns:ds="http://schemas.openxmlformats.org/officeDocument/2006/customXml" ds:itemID="{7B6F2769-7194-4217-93D3-3AF3A4742282}">
-  <ds:schemaRefs>
-    <ds:schemaRef ds:uri="http://schemas.microsoft.com/office/2006/metadata/properties"/>
-    <ds:schemaRef ds:uri="http://schemas.microsoft.com/office/infopath/2007/PartnerControls"/>
-    <ds:schemaRef ds:uri="http://schemas.microsoft.com/sharepoint/v3/fields"/>
-  </ds:schemaRefs>
-</ds:datastoreItem>
 </file>
</xml_diff>